<commit_message>
atualizando fronteiras do modelo
</commit_message>
<xml_diff>
--- a/dissertacao-docs/apresentacoes/Dissertação-Apresentação-Resultados.pptx
+++ b/dissertacao-docs/apresentacoes/Dissertação-Apresentação-Resultados.pptx
@@ -281,7 +281,7 @@
           <a:p>
             <a:fld id="{20821C4A-F6A4-4B59-9A59-2DAF852270ED}" type="datetimeFigureOut">
               <a:rPr lang="pt-BR" smtClean="0"/>
-              <a:t>03/01/2018</a:t>
+              <a:t>22/01/2018</a:t>
             </a:fld>
             <a:endParaRPr lang="pt-BR"/>
           </a:p>
@@ -736,7 +736,7 @@
           <a:p>
             <a:fld id="{3718F442-760B-4938-8623-6FC8F246D0CD}" type="datetimeFigureOut">
               <a:rPr lang="pt-BR" smtClean="0"/>
-              <a:t>03/01/2018</a:t>
+              <a:t>22/01/2018</a:t>
             </a:fld>
             <a:endParaRPr lang="pt-BR"/>
           </a:p>
@@ -909,7 +909,7 @@
           <a:p>
             <a:fld id="{3718F442-760B-4938-8623-6FC8F246D0CD}" type="datetimeFigureOut">
               <a:rPr lang="pt-BR" smtClean="0"/>
-              <a:t>03/01/2018</a:t>
+              <a:t>22/01/2018</a:t>
             </a:fld>
             <a:endParaRPr lang="pt-BR"/>
           </a:p>
@@ -1111,7 +1111,7 @@
           <a:p>
             <a:fld id="{3718F442-760B-4938-8623-6FC8F246D0CD}" type="datetimeFigureOut">
               <a:rPr lang="pt-BR" smtClean="0"/>
-              <a:t>03/01/2018</a:t>
+              <a:t>22/01/2018</a:t>
             </a:fld>
             <a:endParaRPr lang="pt-BR"/>
           </a:p>
@@ -1303,7 +1303,7 @@
           <a:p>
             <a:fld id="{3718F442-760B-4938-8623-6FC8F246D0CD}" type="datetimeFigureOut">
               <a:rPr lang="pt-BR" smtClean="0"/>
-              <a:t>03/01/2018</a:t>
+              <a:t>22/01/2018</a:t>
             </a:fld>
             <a:endParaRPr lang="pt-BR"/>
           </a:p>
@@ -1545,7 +1545,7 @@
           <a:p>
             <a:fld id="{3718F442-760B-4938-8623-6FC8F246D0CD}" type="datetimeFigureOut">
               <a:rPr lang="pt-BR" smtClean="0"/>
-              <a:t>03/01/2018</a:t>
+              <a:t>22/01/2018</a:t>
             </a:fld>
             <a:endParaRPr lang="pt-BR"/>
           </a:p>
@@ -1854,7 +1854,7 @@
           <a:p>
             <a:fld id="{3718F442-760B-4938-8623-6FC8F246D0CD}" type="datetimeFigureOut">
               <a:rPr lang="pt-BR" smtClean="0"/>
-              <a:t>03/01/2018</a:t>
+              <a:t>22/01/2018</a:t>
             </a:fld>
             <a:endParaRPr lang="pt-BR"/>
           </a:p>
@@ -2302,7 +2302,7 @@
           <a:p>
             <a:fld id="{3718F442-760B-4938-8623-6FC8F246D0CD}" type="datetimeFigureOut">
               <a:rPr lang="pt-BR" smtClean="0"/>
-              <a:t>03/01/2018</a:t>
+              <a:t>22/01/2018</a:t>
             </a:fld>
             <a:endParaRPr lang="pt-BR"/>
           </a:p>
@@ -2443,7 +2443,7 @@
           <a:p>
             <a:fld id="{3718F442-760B-4938-8623-6FC8F246D0CD}" type="datetimeFigureOut">
               <a:rPr lang="pt-BR" smtClean="0"/>
-              <a:t>03/01/2018</a:t>
+              <a:t>22/01/2018</a:t>
             </a:fld>
             <a:endParaRPr lang="pt-BR"/>
           </a:p>
@@ -2562,7 +2562,7 @@
           <a:p>
             <a:fld id="{3718F442-760B-4938-8623-6FC8F246D0CD}" type="datetimeFigureOut">
               <a:rPr lang="pt-BR" smtClean="0"/>
-              <a:t>03/01/2018</a:t>
+              <a:t>22/01/2018</a:t>
             </a:fld>
             <a:endParaRPr lang="pt-BR"/>
           </a:p>
@@ -2834,7 +2834,7 @@
           <a:p>
             <a:fld id="{3718F442-760B-4938-8623-6FC8F246D0CD}" type="datetimeFigureOut">
               <a:rPr lang="pt-BR" smtClean="0"/>
-              <a:t>03/01/2018</a:t>
+              <a:t>22/01/2018</a:t>
             </a:fld>
             <a:endParaRPr lang="pt-BR"/>
           </a:p>
@@ -3113,7 +3113,7 @@
           <a:p>
             <a:fld id="{3718F442-760B-4938-8623-6FC8F246D0CD}" type="datetimeFigureOut">
               <a:rPr lang="pt-BR" smtClean="0"/>
-              <a:t>03/01/2018</a:t>
+              <a:t>22/01/2018</a:t>
             </a:fld>
             <a:endParaRPr lang="pt-BR"/>
           </a:p>
@@ -28451,39 +28451,6 @@
       </p:grpSpPr>
       <p:sp>
         <p:nvSpPr>
-          <p:cNvPr id="2" name="Título 1">
-            <a:extLst>
-              <a:ext uri="{FF2B5EF4-FFF2-40B4-BE49-F238E27FC236}">
-                <a16:creationId xmlns:a16="http://schemas.microsoft.com/office/drawing/2014/main" id="{8DD8EBD0-B206-4079-9CB7-D339D20E280E}"/>
-              </a:ext>
-            </a:extLst>
-          </p:cNvPr>
-          <p:cNvSpPr>
-            <a:spLocks noGrp="1"/>
-          </p:cNvSpPr>
-          <p:nvPr>
-            <p:ph type="title"/>
-          </p:nvPr>
-        </p:nvSpPr>
-        <p:spPr>
-          <a:xfrm>
-            <a:off x="457200" y="274639"/>
-            <a:ext cx="8229600" cy="1143000"/>
-          </a:xfrm>
-        </p:spPr>
-        <p:txBody>
-          <a:bodyPr/>
-          <a:lstStyle/>
-          <a:p>
-            <a:r>
-              <a:rPr lang="pt-BR" dirty="0"/>
-              <a:t>Diagrama de Fronteiras do Modelo</a:t>
-            </a:r>
-          </a:p>
-        </p:txBody>
-      </p:sp>
-      <p:sp>
-        <p:nvSpPr>
           <p:cNvPr id="4" name="Retângulo 3">
             <a:extLst>
               <a:ext uri="{FF2B5EF4-FFF2-40B4-BE49-F238E27FC236}">
@@ -28496,7 +28463,7 @@
         </p:nvSpPr>
         <p:spPr>
           <a:xfrm>
-            <a:off x="2311879" y="3818298"/>
+            <a:off x="2085979" y="3537747"/>
             <a:ext cx="1239425" cy="627387"/>
           </a:xfrm>
           <a:prstGeom prst="rect">
@@ -28559,7 +28526,7 @@
         </p:nvSpPr>
         <p:spPr>
           <a:xfrm>
-            <a:off x="4082688" y="5099065"/>
+            <a:off x="3856788" y="4818514"/>
             <a:ext cx="1239425" cy="627387"/>
           </a:xfrm>
           <a:prstGeom prst="rect">
@@ -28622,7 +28589,7 @@
         </p:nvSpPr>
         <p:spPr>
           <a:xfrm>
-            <a:off x="4077820" y="2701439"/>
+            <a:off x="3851920" y="2420888"/>
             <a:ext cx="1239425" cy="570352"/>
           </a:xfrm>
           <a:prstGeom prst="rect">
@@ -28696,7 +28663,7 @@
         </p:nvSpPr>
         <p:spPr>
           <a:xfrm>
-            <a:off x="4077821" y="1916832"/>
+            <a:off x="3851921" y="1636281"/>
             <a:ext cx="1239425" cy="570352"/>
           </a:xfrm>
           <a:prstGeom prst="rect">
@@ -28759,7 +28726,7 @@
         </p:nvSpPr>
         <p:spPr>
           <a:xfrm>
-            <a:off x="5719183" y="4066116"/>
+            <a:off x="5493283" y="3785565"/>
             <a:ext cx="1239425" cy="759138"/>
           </a:xfrm>
           <a:prstGeom prst="rect">
@@ -28817,7 +28784,7 @@
         </p:nvSpPr>
         <p:spPr>
           <a:xfrm>
-            <a:off x="5719183" y="3074377"/>
+            <a:off x="5493283" y="2793826"/>
             <a:ext cx="1239425" cy="759138"/>
           </a:xfrm>
           <a:prstGeom prst="rect">
@@ -28882,7 +28849,7 @@
         </p:nvSpPr>
         <p:spPr>
           <a:xfrm>
-            <a:off x="4082687" y="3841753"/>
+            <a:off x="3856787" y="3561202"/>
             <a:ext cx="1239425" cy="570352"/>
           </a:xfrm>
           <a:prstGeom prst="rect">
@@ -28973,7 +28940,7 @@
         </p:nvSpPr>
         <p:spPr>
           <a:xfrm>
-            <a:off x="2311879" y="5105869"/>
+            <a:off x="2085979" y="4825318"/>
             <a:ext cx="1239425" cy="627387"/>
           </a:xfrm>
           <a:prstGeom prst="rect">
@@ -29036,8 +29003,8 @@
         </p:nvSpPr>
         <p:spPr>
           <a:xfrm>
-            <a:off x="971600" y="3841753"/>
-            <a:ext cx="1185352" cy="428514"/>
+            <a:off x="745700" y="3430396"/>
+            <a:ext cx="1185352" cy="690126"/>
           </a:xfrm>
           <a:prstGeom prst="rect">
             <a:avLst/>
@@ -29071,7 +29038,21 @@
                 <a:latin typeface="Arial" panose="020B0604020202020204" pitchFamily="34" charset="0"/>
                 <a:cs typeface="Arial" panose="020B0604020202020204" pitchFamily="34" charset="0"/>
               </a:rPr>
-              <a:t>Estratégia de Capacidade</a:t>
+              <a:t>Market </a:t>
+            </a:r>
+            <a:r>
+              <a:rPr lang="pt-BR" sz="1000" dirty="0" err="1">
+                <a:latin typeface="Arial" panose="020B0604020202020204" pitchFamily="34" charset="0"/>
+                <a:cs typeface="Arial" panose="020B0604020202020204" pitchFamily="34" charset="0"/>
+              </a:rPr>
+              <a:t>Share</a:t>
+            </a:r>
+            <a:r>
+              <a:rPr lang="pt-BR" sz="1000" dirty="0">
+                <a:latin typeface="Arial" panose="020B0604020202020204" pitchFamily="34" charset="0"/>
+                <a:cs typeface="Arial" panose="020B0604020202020204" pitchFamily="34" charset="0"/>
+              </a:rPr>
+              <a:t> Alvo; Postura Agressiva / Conservadora</a:t>
             </a:r>
           </a:p>
         </p:txBody>
@@ -29090,7 +29071,7 @@
         </p:nvSpPr>
         <p:spPr>
           <a:xfrm>
-            <a:off x="2316847" y="2735574"/>
+            <a:off x="2090947" y="2455023"/>
             <a:ext cx="1239425" cy="627387"/>
           </a:xfrm>
           <a:prstGeom prst="rect">
@@ -29156,7 +29137,7 @@
         </p:nvCxnSpPr>
         <p:spPr>
           <a:xfrm>
-            <a:off x="5317246" y="2202008"/>
+            <a:off x="5091346" y="1921457"/>
             <a:ext cx="1021650" cy="872369"/>
           </a:xfrm>
           <a:prstGeom prst="bentConnector2">
@@ -29198,7 +29179,7 @@
         </p:nvCxnSpPr>
         <p:spPr>
           <a:xfrm flipV="1">
-            <a:off x="5007389" y="4411325"/>
+            <a:off x="4781489" y="4130774"/>
             <a:ext cx="0" cy="682321"/>
           </a:xfrm>
           <a:prstGeom prst="straightConnector1">
@@ -29242,7 +29223,7 @@
         </p:nvCxnSpPr>
         <p:spPr>
           <a:xfrm rot="5400000">
-            <a:off x="4590406" y="2594311"/>
+            <a:off x="4364506" y="2313760"/>
             <a:ext cx="214256" cy="1"/>
           </a:xfrm>
           <a:prstGeom prst="curvedConnector3">
@@ -29288,7 +29269,7 @@
         </p:nvCxnSpPr>
         <p:spPr>
           <a:xfrm rot="5400000" flipH="1" flipV="1">
-            <a:off x="3240407" y="1898161"/>
+            <a:off x="3014507" y="1617610"/>
             <a:ext cx="533566" cy="1141261"/>
           </a:xfrm>
           <a:prstGeom prst="bentConnector2">
@@ -29332,7 +29313,7 @@
         </p:nvCxnSpPr>
         <p:spPr>
           <a:xfrm>
-            <a:off x="4697532" y="3271791"/>
+            <a:off x="4471632" y="2991240"/>
             <a:ext cx="4867" cy="569962"/>
           </a:xfrm>
           <a:prstGeom prst="straightConnector1">
@@ -29376,7 +29357,7 @@
         </p:nvCxnSpPr>
         <p:spPr>
           <a:xfrm flipH="1">
-            <a:off x="2931591" y="3362961"/>
+            <a:off x="2705691" y="3082410"/>
             <a:ext cx="4968" cy="455337"/>
           </a:xfrm>
           <a:prstGeom prst="straightConnector1">
@@ -29420,7 +29401,7 @@
         </p:nvCxnSpPr>
         <p:spPr>
           <a:xfrm rot="10800000">
-            <a:off x="3556272" y="3049268"/>
+            <a:off x="3330372" y="2768717"/>
             <a:ext cx="526415" cy="1077661"/>
           </a:xfrm>
           <a:prstGeom prst="bentConnector3">
@@ -29464,7 +29445,7 @@
         </p:nvCxnSpPr>
         <p:spPr>
           <a:xfrm rot="5400000">
-            <a:off x="3470113" y="3873583"/>
+            <a:off x="3244213" y="3593032"/>
             <a:ext cx="693765" cy="1770808"/>
           </a:xfrm>
           <a:prstGeom prst="bentConnector3">
@@ -29510,7 +29491,7 @@
         </p:nvCxnSpPr>
         <p:spPr>
           <a:xfrm flipV="1">
-            <a:off x="3551304" y="5412758"/>
+            <a:off x="3325404" y="5132207"/>
             <a:ext cx="531384" cy="6804"/>
           </a:xfrm>
           <a:prstGeom prst="straightConnector1">
@@ -29554,7 +29535,7 @@
         </p:nvCxnSpPr>
         <p:spPr>
           <a:xfrm flipH="1" flipV="1">
-            <a:off x="5317245" y="2986616"/>
+            <a:off x="5091345" y="2706065"/>
             <a:ext cx="4868" cy="2426143"/>
           </a:xfrm>
           <a:prstGeom prst="bentConnector3">
@@ -29600,7 +29581,7 @@
         </p:nvCxnSpPr>
         <p:spPr>
           <a:xfrm>
-            <a:off x="6338896" y="3833515"/>
+            <a:off x="6112996" y="3552964"/>
             <a:ext cx="0" cy="232601"/>
           </a:xfrm>
           <a:prstGeom prst="straightConnector1">
@@ -29644,7 +29625,7 @@
         </p:nvCxnSpPr>
         <p:spPr>
           <a:xfrm rot="10800000">
-            <a:off x="5322113" y="4126929"/>
+            <a:off x="5096213" y="3846378"/>
             <a:ext cx="397071" cy="318756"/>
           </a:xfrm>
           <a:prstGeom prst="bentConnector3">
@@ -29690,7 +29671,7 @@
         </p:nvCxnSpPr>
         <p:spPr>
           <a:xfrm flipH="1">
-            <a:off x="3551304" y="4126929"/>
+            <a:off x="3325404" y="3846378"/>
             <a:ext cx="531383" cy="5063"/>
           </a:xfrm>
           <a:prstGeom prst="straightConnector1">
@@ -29734,12 +29715,12 @@
         </p:nvCxnSpPr>
         <p:spPr>
           <a:xfrm rot="5400000" flipH="1" flipV="1">
-            <a:off x="2168444" y="1312664"/>
-            <a:ext cx="1924921" cy="3133257"/>
+            <a:off x="2007948" y="966710"/>
+            <a:ext cx="1794115" cy="3133258"/>
           </a:xfrm>
           <a:prstGeom prst="bentConnector3">
             <a:avLst>
-              <a:gd name="adj1" fmla="val 108943"/>
+              <a:gd name="adj1" fmla="val 112742"/>
             </a:avLst>
           </a:prstGeom>
           <a:ln>
@@ -29780,12 +29761,12 @@
         </p:nvCxnSpPr>
         <p:spPr>
           <a:xfrm rot="16200000" flipH="1">
-            <a:off x="2405245" y="3429296"/>
-            <a:ext cx="1456185" cy="3138125"/>
+            <a:off x="2244749" y="3214148"/>
+            <a:ext cx="1325379" cy="3138125"/>
           </a:xfrm>
           <a:prstGeom prst="bentConnector3">
             <a:avLst>
-              <a:gd name="adj1" fmla="val 111821"/>
+              <a:gd name="adj1" fmla="val 117248"/>
             </a:avLst>
           </a:prstGeom>
           <a:ln>
@@ -29822,7 +29803,7 @@
         </p:nvSpPr>
         <p:spPr>
           <a:xfrm>
-            <a:off x="5422538" y="2361162"/>
+            <a:off x="5196638" y="2080611"/>
             <a:ext cx="811065" cy="338554"/>
           </a:xfrm>
           <a:prstGeom prst="rect">
@@ -29874,7 +29855,7 @@
         </p:nvSpPr>
         <p:spPr>
           <a:xfrm>
-            <a:off x="3150740" y="2359083"/>
+            <a:off x="2924840" y="2078532"/>
             <a:ext cx="811065" cy="338554"/>
           </a:xfrm>
           <a:prstGeom prst="rect">
@@ -29937,7 +29918,7 @@
         </p:nvSpPr>
         <p:spPr>
           <a:xfrm>
-            <a:off x="3542842" y="4818952"/>
+            <a:off x="3316942" y="4538401"/>
             <a:ext cx="811065" cy="338554"/>
           </a:xfrm>
           <a:prstGeom prst="rect">
@@ -30003,7 +29984,7 @@
         </p:nvSpPr>
         <p:spPr>
           <a:xfrm>
-            <a:off x="7447375" y="3655270"/>
+            <a:off x="7221475" y="3374719"/>
             <a:ext cx="1239425" cy="570352"/>
           </a:xfrm>
           <a:prstGeom prst="rect">
@@ -30034,20 +30015,22 @@
           <a:lstStyle/>
           <a:p>
             <a:r>
-              <a:rPr lang="pt-BR" sz="1000" dirty="0" err="1">
+              <a:rPr lang="pt-BR" sz="1000" dirty="0">
+                <a:solidFill>
+                  <a:schemeClr val="dk1"/>
+                </a:solidFill>
                 <a:latin typeface="Arial" panose="020B0604020202020204" pitchFamily="34" charset="0"/>
                 <a:cs typeface="Arial" panose="020B0604020202020204" pitchFamily="34" charset="0"/>
               </a:rPr>
-              <a:t>PeD</a:t>
+              <a:t>P&amp;D</a:t>
             </a:r>
-            <a:endParaRPr lang="pt-BR" sz="1000" dirty="0">
-              <a:latin typeface="Arial" panose="020B0604020202020204" pitchFamily="34" charset="0"/>
-              <a:cs typeface="Arial" panose="020B0604020202020204" pitchFamily="34" charset="0"/>
-            </a:endParaRPr>
           </a:p>
           <a:p>
             <a:r>
               <a:rPr lang="pt-BR" sz="800" dirty="0">
+                <a:solidFill>
+                  <a:schemeClr val="dk1"/>
+                </a:solidFill>
                 <a:latin typeface="Arial" panose="020B0604020202020204" pitchFamily="34" charset="0"/>
                 <a:cs typeface="Arial" panose="020B0604020202020204" pitchFamily="34" charset="0"/>
               </a:rPr>
@@ -30074,7 +30057,7 @@
         </p:nvCxnSpPr>
         <p:spPr>
           <a:xfrm rot="16200000" flipV="1">
-            <a:off x="6357840" y="1946021"/>
+            <a:off x="6131940" y="1665470"/>
             <a:ext cx="668655" cy="2749843"/>
           </a:xfrm>
           <a:prstGeom prst="bentConnector2">
@@ -30118,7 +30101,7 @@
         </p:nvCxnSpPr>
         <p:spPr>
           <a:xfrm rot="5400000" flipH="1" flipV="1">
-            <a:off x="6291502" y="2636520"/>
+            <a:off x="6065602" y="2355969"/>
             <a:ext cx="186483" cy="3364688"/>
           </a:xfrm>
           <a:prstGeom prst="bentConnector3">
@@ -30146,6 +30129,315 @@
           </a:fontRef>
         </p:style>
       </p:cxnSp>
+      <p:sp>
+        <p:nvSpPr>
+          <p:cNvPr id="3" name="Retângulo 2">
+            <a:extLst>
+              <a:ext uri="{FF2B5EF4-FFF2-40B4-BE49-F238E27FC236}">
+                <a16:creationId xmlns:a16="http://schemas.microsoft.com/office/drawing/2014/main" id="{1B2B80FB-266D-4012-921C-57F0477FD1CD}"/>
+              </a:ext>
+            </a:extLst>
+          </p:cNvPr>
+          <p:cNvSpPr/>
+          <p:nvPr/>
+        </p:nvSpPr>
+        <p:spPr>
+          <a:xfrm>
+            <a:off x="377727" y="981295"/>
+            <a:ext cx="8309073" cy="4967985"/>
+          </a:xfrm>
+          <a:prstGeom prst="rect">
+            <a:avLst/>
+          </a:prstGeom>
+          <a:noFill/>
+          <a:ln>
+            <a:solidFill>
+              <a:schemeClr val="tx1"/>
+            </a:solidFill>
+            <a:prstDash val="dash"/>
+          </a:ln>
+        </p:spPr>
+        <p:style>
+          <a:lnRef idx="2">
+            <a:schemeClr val="accent1">
+              <a:shade val="50000"/>
+            </a:schemeClr>
+          </a:lnRef>
+          <a:fillRef idx="1">
+            <a:schemeClr val="accent1"/>
+          </a:fillRef>
+          <a:effectRef idx="0">
+            <a:schemeClr val="accent1"/>
+          </a:effectRef>
+          <a:fontRef idx="minor">
+            <a:schemeClr val="lt1"/>
+          </a:fontRef>
+        </p:style>
+        <p:txBody>
+          <a:bodyPr rtlCol="0" anchor="ctr"/>
+          <a:lstStyle/>
+          <a:p>
+            <a:pPr algn="ctr"/>
+            <a:endParaRPr lang="pt-BR">
+              <a:latin typeface="Arial" panose="020B0604020202020204" pitchFamily="34" charset="0"/>
+              <a:cs typeface="Arial" panose="020B0604020202020204" pitchFamily="34" charset="0"/>
+            </a:endParaRPr>
+          </a:p>
+        </p:txBody>
+      </p:sp>
+      <p:sp>
+        <p:nvSpPr>
+          <p:cNvPr id="36" name="Retângulo 35">
+            <a:extLst>
+              <a:ext uri="{FF2B5EF4-FFF2-40B4-BE49-F238E27FC236}">
+                <a16:creationId xmlns:a16="http://schemas.microsoft.com/office/drawing/2014/main" id="{7B202B07-CE48-426B-8EB7-9DA5525133EC}"/>
+              </a:ext>
+            </a:extLst>
+          </p:cNvPr>
+          <p:cNvSpPr/>
+          <p:nvPr/>
+        </p:nvSpPr>
+        <p:spPr>
+          <a:xfrm>
+            <a:off x="467544" y="1045256"/>
+            <a:ext cx="870832" cy="366844"/>
+          </a:xfrm>
+          <a:prstGeom prst="rect">
+            <a:avLst/>
+          </a:prstGeom>
+          <a:ln>
+            <a:noFill/>
+          </a:ln>
+        </p:spPr>
+        <p:style>
+          <a:lnRef idx="2">
+            <a:schemeClr val="dk1"/>
+          </a:lnRef>
+          <a:fillRef idx="1">
+            <a:schemeClr val="lt1"/>
+          </a:fillRef>
+          <a:effectRef idx="0">
+            <a:schemeClr val="dk1"/>
+          </a:effectRef>
+          <a:fontRef idx="minor">
+            <a:schemeClr val="dk1"/>
+          </a:fontRef>
+        </p:style>
+        <p:txBody>
+          <a:bodyPr rtlCol="0" anchor="ctr"/>
+          <a:lstStyle/>
+          <a:p>
+            <a:pPr algn="ctr"/>
+            <a:r>
+              <a:rPr lang="pt-BR" sz="1050" dirty="0">
+                <a:latin typeface="Arial" panose="020B0604020202020204" pitchFamily="34" charset="0"/>
+                <a:cs typeface="Arial" panose="020B0604020202020204" pitchFamily="34" charset="0"/>
+              </a:rPr>
+              <a:t>Modelo</a:t>
+            </a:r>
+          </a:p>
+        </p:txBody>
+      </p:sp>
+      <p:sp>
+        <p:nvSpPr>
+          <p:cNvPr id="38" name="Retângulo 37">
+            <a:extLst>
+              <a:ext uri="{FF2B5EF4-FFF2-40B4-BE49-F238E27FC236}">
+                <a16:creationId xmlns:a16="http://schemas.microsoft.com/office/drawing/2014/main" id="{8DA45935-3F72-4D84-AEFB-EF0243F7014E}"/>
+              </a:ext>
+            </a:extLst>
+          </p:cNvPr>
+          <p:cNvSpPr/>
+          <p:nvPr/>
+        </p:nvSpPr>
+        <p:spPr>
+          <a:xfrm>
+            <a:off x="377727" y="347525"/>
+            <a:ext cx="1129295" cy="274142"/>
+          </a:xfrm>
+          <a:prstGeom prst="rect">
+            <a:avLst/>
+          </a:prstGeom>
+          <a:ln>
+            <a:noFill/>
+          </a:ln>
+        </p:spPr>
+        <p:style>
+          <a:lnRef idx="2">
+            <a:schemeClr val="dk1"/>
+          </a:lnRef>
+          <a:fillRef idx="1">
+            <a:schemeClr val="lt1"/>
+          </a:fillRef>
+          <a:effectRef idx="0">
+            <a:schemeClr val="dk1"/>
+          </a:effectRef>
+          <a:fontRef idx="minor">
+            <a:schemeClr val="dk1"/>
+          </a:fontRef>
+        </p:style>
+        <p:txBody>
+          <a:bodyPr rtlCol="0" anchor="ctr"/>
+          <a:lstStyle/>
+          <a:p>
+            <a:pPr algn="ctr"/>
+            <a:r>
+              <a:rPr lang="pt-BR" sz="1050" dirty="0">
+                <a:latin typeface="Arial" panose="020B0604020202020204" pitchFamily="34" charset="0"/>
+                <a:cs typeface="Arial" panose="020B0604020202020204" pitchFamily="34" charset="0"/>
+              </a:rPr>
+              <a:t>Elementos não inseridos no modelo.</a:t>
+            </a:r>
+          </a:p>
+        </p:txBody>
+      </p:sp>
+      <p:sp>
+        <p:nvSpPr>
+          <p:cNvPr id="40" name="Retângulo 39">
+            <a:extLst>
+              <a:ext uri="{FF2B5EF4-FFF2-40B4-BE49-F238E27FC236}">
+                <a16:creationId xmlns:a16="http://schemas.microsoft.com/office/drawing/2014/main" id="{C2CE86B7-3945-4B6E-95F5-BA4866497972}"/>
+              </a:ext>
+            </a:extLst>
+          </p:cNvPr>
+          <p:cNvSpPr/>
+          <p:nvPr/>
+        </p:nvSpPr>
+        <p:spPr>
+          <a:xfrm>
+            <a:off x="1584750" y="122924"/>
+            <a:ext cx="7223776" cy="737113"/>
+          </a:xfrm>
+          <a:prstGeom prst="rect">
+            <a:avLst/>
+          </a:prstGeom>
+          <a:ln>
+            <a:noFill/>
+          </a:ln>
+        </p:spPr>
+        <p:style>
+          <a:lnRef idx="2">
+            <a:schemeClr val="dk1"/>
+          </a:lnRef>
+          <a:fillRef idx="1">
+            <a:schemeClr val="lt1"/>
+          </a:fillRef>
+          <a:effectRef idx="0">
+            <a:schemeClr val="dk1"/>
+          </a:effectRef>
+          <a:fontRef idx="minor">
+            <a:schemeClr val="dk1"/>
+          </a:fontRef>
+        </p:style>
+        <p:txBody>
+          <a:bodyPr numCol="3" rtlCol="0" anchor="ctr"/>
+          <a:lstStyle/>
+          <a:p>
+            <a:pPr marL="171450" indent="-171450">
+              <a:buFont typeface="Arial" panose="020B0604020202020204" pitchFamily="34" charset="0"/>
+              <a:buChar char="•"/>
+            </a:pPr>
+            <a:r>
+              <a:rPr lang="pt-BR" sz="1050" dirty="0">
+                <a:latin typeface="Arial" panose="020B0604020202020204" pitchFamily="34" charset="0"/>
+                <a:cs typeface="Arial" panose="020B0604020202020204" pitchFamily="34" charset="0"/>
+              </a:rPr>
+              <a:t>Dinâmica de Substituição de Novos Modelos;</a:t>
+            </a:r>
+          </a:p>
+          <a:p>
+            <a:pPr marL="171450" indent="-171450">
+              <a:buFont typeface="Arial" panose="020B0604020202020204" pitchFamily="34" charset="0"/>
+              <a:buChar char="•"/>
+            </a:pPr>
+            <a:r>
+              <a:rPr lang="pt-BR" sz="1050" dirty="0">
+                <a:latin typeface="Arial" panose="020B0604020202020204" pitchFamily="34" charset="0"/>
+                <a:cs typeface="Arial" panose="020B0604020202020204" pitchFamily="34" charset="0"/>
+              </a:rPr>
+              <a:t>Aquisições entre Players;</a:t>
+            </a:r>
+          </a:p>
+          <a:p>
+            <a:pPr marL="171450" indent="-171450">
+              <a:buFont typeface="Arial" panose="020B0604020202020204" pitchFamily="34" charset="0"/>
+              <a:buChar char="•"/>
+            </a:pPr>
+            <a:r>
+              <a:rPr lang="pt-BR" sz="1050" dirty="0">
+                <a:latin typeface="Arial" panose="020B0604020202020204" pitchFamily="34" charset="0"/>
+                <a:cs typeface="Arial" panose="020B0604020202020204" pitchFamily="34" charset="0"/>
+              </a:rPr>
+              <a:t>Licenciamento de Patentes;</a:t>
+            </a:r>
+          </a:p>
+          <a:p>
+            <a:pPr marL="171450" indent="-171450">
+              <a:buFont typeface="Arial" panose="020B0604020202020204" pitchFamily="34" charset="0"/>
+              <a:buChar char="•"/>
+            </a:pPr>
+            <a:r>
+              <a:rPr lang="pt-BR" sz="1050" dirty="0">
+                <a:latin typeface="Arial" panose="020B0604020202020204" pitchFamily="34" charset="0"/>
+                <a:cs typeface="Arial" panose="020B0604020202020204" pitchFamily="34" charset="0"/>
+              </a:rPr>
+              <a:t>Entrada de Novos Players;</a:t>
+            </a:r>
+          </a:p>
+          <a:p>
+            <a:pPr marL="171450" indent="-171450">
+              <a:buFont typeface="Arial" panose="020B0604020202020204" pitchFamily="34" charset="0"/>
+              <a:buChar char="•"/>
+            </a:pPr>
+            <a:r>
+              <a:rPr lang="pt-BR" sz="1050" dirty="0">
+                <a:latin typeface="Arial" panose="020B0604020202020204" pitchFamily="34" charset="0"/>
+                <a:cs typeface="Arial" panose="020B0604020202020204" pitchFamily="34" charset="0"/>
+              </a:rPr>
+              <a:t>Mercado de Serviços de Impressão 3D;</a:t>
+            </a:r>
+          </a:p>
+          <a:p>
+            <a:pPr marL="171450" indent="-171450">
+              <a:buFont typeface="Arial" panose="020B0604020202020204" pitchFamily="34" charset="0"/>
+              <a:buChar char="•"/>
+            </a:pPr>
+            <a:r>
+              <a:rPr lang="pt-BR" sz="1050" dirty="0">
+                <a:latin typeface="Arial" panose="020B0604020202020204" pitchFamily="34" charset="0"/>
+                <a:cs typeface="Arial" panose="020B0604020202020204" pitchFamily="34" charset="0"/>
+              </a:rPr>
+              <a:t>Interferência do Mercado Financeiro sobre a indústria</a:t>
+            </a:r>
+          </a:p>
+          <a:p>
+            <a:pPr marL="171450" indent="-171450">
+              <a:buFont typeface="Arial" panose="020B0604020202020204" pitchFamily="34" charset="0"/>
+              <a:buChar char="•"/>
+            </a:pPr>
+            <a:r>
+              <a:rPr lang="pt-BR" sz="1050" dirty="0">
+                <a:latin typeface="Arial" panose="020B0604020202020204" pitchFamily="34" charset="0"/>
+                <a:cs typeface="Arial" panose="020B0604020202020204" pitchFamily="34" charset="0"/>
+              </a:rPr>
+              <a:t>Venda de Matéria Prima para impressoras 3D.</a:t>
+            </a:r>
+          </a:p>
+          <a:p>
+            <a:pPr marL="171450" indent="-171450">
+              <a:buFont typeface="Arial" panose="020B0604020202020204" pitchFamily="34" charset="0"/>
+              <a:buChar char="•"/>
+            </a:pPr>
+            <a:r>
+              <a:rPr lang="pt-BR" sz="1050" dirty="0">
+                <a:latin typeface="Arial" panose="020B0604020202020204" pitchFamily="34" charset="0"/>
+                <a:cs typeface="Arial" panose="020B0604020202020204" pitchFamily="34" charset="0"/>
+              </a:rPr>
+              <a:t>Mercado de Imp. 3D não-industriais.</a:t>
+            </a:r>
+          </a:p>
+        </p:txBody>
+      </p:sp>
     </p:spTree>
     <p:extLst>
       <p:ext uri="{BB962C8B-B14F-4D97-AF65-F5344CB8AC3E}">

</xml_diff>